<commit_message>
meet 2 edits fin
</commit_message>
<xml_diff>
--- a/Presentation_RealEstate.pptx
+++ b/Presentation_RealEstate.pptx
@@ -4,16 +4,21 @@
   <p:sldMasterIdLst>
     <p:sldMasterId id="2147483648" r:id="rId1"/>
   </p:sldMasterIdLst>
+  <p:notesMasterIdLst>
+    <p:notesMasterId r:id="rId13"/>
+  </p:notesMasterIdLst>
   <p:sldIdLst>
     <p:sldId id="256" r:id="rId2"/>
     <p:sldId id="266" r:id="rId3"/>
     <p:sldId id="270" r:id="rId4"/>
     <p:sldId id="271" r:id="rId5"/>
     <p:sldId id="272" r:id="rId6"/>
-    <p:sldId id="278" r:id="rId7"/>
+    <p:sldId id="281" r:id="rId7"/>
     <p:sldId id="274" r:id="rId8"/>
-    <p:sldId id="276" r:id="rId9"/>
-    <p:sldId id="280" r:id="rId10"/>
+    <p:sldId id="282" r:id="rId9"/>
+    <p:sldId id="283" r:id="rId10"/>
+    <p:sldId id="276" r:id="rId11"/>
+    <p:sldId id="280" r:id="rId12"/>
   </p:sldIdLst>
   <p:sldSz cx="12192000" cy="6858000"/>
   <p:notesSz cx="7315200" cy="9601200"/>
@@ -120,6 +125,526 @@
 </p:presentation>
 </file>
 
+<file path=ppt/notesMasters/notesMaster1.xml><?xml version="1.0" encoding="utf-8"?>
+<p:notesMaster xmlns:a="http://schemas.openxmlformats.org/drawingml/2006/main" xmlns:r="http://schemas.openxmlformats.org/officeDocument/2006/relationships" xmlns:p="http://schemas.openxmlformats.org/presentationml/2006/main">
+  <p:cSld>
+    <p:bg>
+      <p:bgRef idx="1001">
+        <a:schemeClr val="bg1"/>
+      </p:bgRef>
+    </p:bg>
+    <p:spTree>
+      <p:nvGrpSpPr>
+        <p:cNvPr id="1" name=""/>
+        <p:cNvGrpSpPr/>
+        <p:nvPr/>
+      </p:nvGrpSpPr>
+      <p:grpSpPr>
+        <a:xfrm>
+          <a:off x="0" y="0"/>
+          <a:ext cx="0" cy="0"/>
+          <a:chOff x="0" y="0"/>
+          <a:chExt cx="0" cy="0"/>
+        </a:xfrm>
+      </p:grpSpPr>
+      <p:sp>
+        <p:nvSpPr>
+          <p:cNvPr id="2" name="Header Placeholder 1"/>
+          <p:cNvSpPr>
+            <a:spLocks noGrp="1"/>
+          </p:cNvSpPr>
+          <p:nvPr>
+            <p:ph type="hdr" sz="quarter"/>
+          </p:nvPr>
+        </p:nvSpPr>
+        <p:spPr>
+          <a:xfrm>
+            <a:off x="0" y="0"/>
+            <a:ext cx="3170238" cy="481013"/>
+          </a:xfrm>
+          <a:prstGeom prst="rect">
+            <a:avLst/>
+          </a:prstGeom>
+        </p:spPr>
+        <p:txBody>
+          <a:bodyPr vert="horz" lIns="91440" tIns="45720" rIns="91440" bIns="45720" rtlCol="0"/>
+          <a:lstStyle>
+            <a:lvl1pPr algn="l">
+              <a:defRPr sz="1200"/>
+            </a:lvl1pPr>
+          </a:lstStyle>
+          <a:p>
+            <a:endParaRPr lang="en-US"/>
+          </a:p>
+        </p:txBody>
+      </p:sp>
+      <p:sp>
+        <p:nvSpPr>
+          <p:cNvPr id="3" name="Date Placeholder 2"/>
+          <p:cNvSpPr>
+            <a:spLocks noGrp="1"/>
+          </p:cNvSpPr>
+          <p:nvPr>
+            <p:ph type="dt" idx="1"/>
+          </p:nvPr>
+        </p:nvSpPr>
+        <p:spPr>
+          <a:xfrm>
+            <a:off x="4143375" y="0"/>
+            <a:ext cx="3170238" cy="481013"/>
+          </a:xfrm>
+          <a:prstGeom prst="rect">
+            <a:avLst/>
+          </a:prstGeom>
+        </p:spPr>
+        <p:txBody>
+          <a:bodyPr vert="horz" lIns="91440" tIns="45720" rIns="91440" bIns="45720" rtlCol="0"/>
+          <a:lstStyle>
+            <a:lvl1pPr algn="r">
+              <a:defRPr sz="1200"/>
+            </a:lvl1pPr>
+          </a:lstStyle>
+          <a:p>
+            <a:fld id="{3D071164-4CDA-4FCA-8EDA-2913C8099303}" type="datetimeFigureOut">
+              <a:rPr lang="en-US" smtClean="0"/>
+              <a:t>5/19/2023</a:t>
+            </a:fld>
+            <a:endParaRPr lang="en-US"/>
+          </a:p>
+        </p:txBody>
+      </p:sp>
+      <p:sp>
+        <p:nvSpPr>
+          <p:cNvPr id="4" name="Slide Image Placeholder 3"/>
+          <p:cNvSpPr>
+            <a:spLocks noGrp="1" noRot="1" noChangeAspect="1"/>
+          </p:cNvSpPr>
+          <p:nvPr>
+            <p:ph type="sldImg" idx="2"/>
+          </p:nvPr>
+        </p:nvSpPr>
+        <p:spPr>
+          <a:xfrm>
+            <a:off x="777875" y="1200150"/>
+            <a:ext cx="5759450" cy="3240088"/>
+          </a:xfrm>
+          <a:prstGeom prst="rect">
+            <a:avLst/>
+          </a:prstGeom>
+          <a:noFill/>
+          <a:ln w="12700">
+            <a:solidFill>
+              <a:prstClr val="black"/>
+            </a:solidFill>
+          </a:ln>
+        </p:spPr>
+        <p:txBody>
+          <a:bodyPr vert="horz" lIns="91440" tIns="45720" rIns="91440" bIns="45720" rtlCol="0" anchor="ctr"/>
+          <a:lstStyle/>
+          <a:p>
+            <a:endParaRPr lang="en-US"/>
+          </a:p>
+        </p:txBody>
+      </p:sp>
+      <p:sp>
+        <p:nvSpPr>
+          <p:cNvPr id="5" name="Notes Placeholder 4"/>
+          <p:cNvSpPr>
+            <a:spLocks noGrp="1"/>
+          </p:cNvSpPr>
+          <p:nvPr>
+            <p:ph type="body" sz="quarter" idx="3"/>
+          </p:nvPr>
+        </p:nvSpPr>
+        <p:spPr>
+          <a:xfrm>
+            <a:off x="731838" y="4621213"/>
+            <a:ext cx="5851525" cy="3779837"/>
+          </a:xfrm>
+          <a:prstGeom prst="rect">
+            <a:avLst/>
+          </a:prstGeom>
+        </p:spPr>
+        <p:txBody>
+          <a:bodyPr vert="horz" lIns="91440" tIns="45720" rIns="91440" bIns="45720" rtlCol="0"/>
+          <a:lstStyle/>
+          <a:p>
+            <a:pPr lvl="0"/>
+            <a:r>
+              <a:rPr lang="en-US"/>
+              <a:t>Click to edit Master text styles</a:t>
+            </a:r>
+          </a:p>
+          <a:p>
+            <a:pPr lvl="1"/>
+            <a:r>
+              <a:rPr lang="en-US"/>
+              <a:t>Second level</a:t>
+            </a:r>
+          </a:p>
+          <a:p>
+            <a:pPr lvl="2"/>
+            <a:r>
+              <a:rPr lang="en-US"/>
+              <a:t>Third level</a:t>
+            </a:r>
+          </a:p>
+          <a:p>
+            <a:pPr lvl="3"/>
+            <a:r>
+              <a:rPr lang="en-US"/>
+              <a:t>Fourth level</a:t>
+            </a:r>
+          </a:p>
+          <a:p>
+            <a:pPr lvl="4"/>
+            <a:r>
+              <a:rPr lang="en-US"/>
+              <a:t>Fifth level</a:t>
+            </a:r>
+          </a:p>
+        </p:txBody>
+      </p:sp>
+      <p:sp>
+        <p:nvSpPr>
+          <p:cNvPr id="6" name="Footer Placeholder 5"/>
+          <p:cNvSpPr>
+            <a:spLocks noGrp="1"/>
+          </p:cNvSpPr>
+          <p:nvPr>
+            <p:ph type="ftr" sz="quarter" idx="4"/>
+          </p:nvPr>
+        </p:nvSpPr>
+        <p:spPr>
+          <a:xfrm>
+            <a:off x="0" y="9120188"/>
+            <a:ext cx="3170238" cy="481012"/>
+          </a:xfrm>
+          <a:prstGeom prst="rect">
+            <a:avLst/>
+          </a:prstGeom>
+        </p:spPr>
+        <p:txBody>
+          <a:bodyPr vert="horz" lIns="91440" tIns="45720" rIns="91440" bIns="45720" rtlCol="0" anchor="b"/>
+          <a:lstStyle>
+            <a:lvl1pPr algn="l">
+              <a:defRPr sz="1200"/>
+            </a:lvl1pPr>
+          </a:lstStyle>
+          <a:p>
+            <a:endParaRPr lang="en-US"/>
+          </a:p>
+        </p:txBody>
+      </p:sp>
+      <p:sp>
+        <p:nvSpPr>
+          <p:cNvPr id="7" name="Slide Number Placeholder 6"/>
+          <p:cNvSpPr>
+            <a:spLocks noGrp="1"/>
+          </p:cNvSpPr>
+          <p:nvPr>
+            <p:ph type="sldNum" sz="quarter" idx="5"/>
+          </p:nvPr>
+        </p:nvSpPr>
+        <p:spPr>
+          <a:xfrm>
+            <a:off x="4143375" y="9120188"/>
+            <a:ext cx="3170238" cy="481012"/>
+          </a:xfrm>
+          <a:prstGeom prst="rect">
+            <a:avLst/>
+          </a:prstGeom>
+        </p:spPr>
+        <p:txBody>
+          <a:bodyPr vert="horz" lIns="91440" tIns="45720" rIns="91440" bIns="45720" rtlCol="0" anchor="b"/>
+          <a:lstStyle>
+            <a:lvl1pPr algn="r">
+              <a:defRPr sz="1200"/>
+            </a:lvl1pPr>
+          </a:lstStyle>
+          <a:p>
+            <a:fld id="{B3C51BA2-DF31-4A6A-B029-3C10AB406522}" type="slidenum">
+              <a:rPr lang="en-US" smtClean="0"/>
+              <a:t>‹#›</a:t>
+            </a:fld>
+            <a:endParaRPr lang="en-US"/>
+          </a:p>
+        </p:txBody>
+      </p:sp>
+    </p:spTree>
+    <p:extLst>
+      <p:ext uri="{BB962C8B-B14F-4D97-AF65-F5344CB8AC3E}">
+        <p14:creationId xmlns:p14="http://schemas.microsoft.com/office/powerpoint/2010/main" val="3757076514"/>
+      </p:ext>
+    </p:extLst>
+  </p:cSld>
+  <p:clrMap bg1="lt1" tx1="dk1" bg2="lt2" tx2="dk2" accent1="accent1" accent2="accent2" accent3="accent3" accent4="accent4" accent5="accent5" accent6="accent6" hlink="hlink" folHlink="folHlink"/>
+  <p:notesStyle>
+    <a:lvl1pPr marL="0" algn="l" defTabSz="914400" rtl="0" eaLnBrk="1" latinLnBrk="0" hangingPunct="1">
+      <a:defRPr sz="1200" kern="1200">
+        <a:solidFill>
+          <a:schemeClr val="tx1"/>
+        </a:solidFill>
+        <a:latin typeface="+mn-lt"/>
+        <a:ea typeface="+mn-ea"/>
+        <a:cs typeface="+mn-cs"/>
+      </a:defRPr>
+    </a:lvl1pPr>
+    <a:lvl2pPr marL="457200" algn="l" defTabSz="914400" rtl="0" eaLnBrk="1" latinLnBrk="0" hangingPunct="1">
+      <a:defRPr sz="1200" kern="1200">
+        <a:solidFill>
+          <a:schemeClr val="tx1"/>
+        </a:solidFill>
+        <a:latin typeface="+mn-lt"/>
+        <a:ea typeface="+mn-ea"/>
+        <a:cs typeface="+mn-cs"/>
+      </a:defRPr>
+    </a:lvl2pPr>
+    <a:lvl3pPr marL="914400" algn="l" defTabSz="914400" rtl="0" eaLnBrk="1" latinLnBrk="0" hangingPunct="1">
+      <a:defRPr sz="1200" kern="1200">
+        <a:solidFill>
+          <a:schemeClr val="tx1"/>
+        </a:solidFill>
+        <a:latin typeface="+mn-lt"/>
+        <a:ea typeface="+mn-ea"/>
+        <a:cs typeface="+mn-cs"/>
+      </a:defRPr>
+    </a:lvl3pPr>
+    <a:lvl4pPr marL="1371600" algn="l" defTabSz="914400" rtl="0" eaLnBrk="1" latinLnBrk="0" hangingPunct="1">
+      <a:defRPr sz="1200" kern="1200">
+        <a:solidFill>
+          <a:schemeClr val="tx1"/>
+        </a:solidFill>
+        <a:latin typeface="+mn-lt"/>
+        <a:ea typeface="+mn-ea"/>
+        <a:cs typeface="+mn-cs"/>
+      </a:defRPr>
+    </a:lvl4pPr>
+    <a:lvl5pPr marL="1828800" algn="l" defTabSz="914400" rtl="0" eaLnBrk="1" latinLnBrk="0" hangingPunct="1">
+      <a:defRPr sz="1200" kern="1200">
+        <a:solidFill>
+          <a:schemeClr val="tx1"/>
+        </a:solidFill>
+        <a:latin typeface="+mn-lt"/>
+        <a:ea typeface="+mn-ea"/>
+        <a:cs typeface="+mn-cs"/>
+      </a:defRPr>
+    </a:lvl5pPr>
+    <a:lvl6pPr marL="2286000" algn="l" defTabSz="914400" rtl="0" eaLnBrk="1" latinLnBrk="0" hangingPunct="1">
+      <a:defRPr sz="1200" kern="1200">
+        <a:solidFill>
+          <a:schemeClr val="tx1"/>
+        </a:solidFill>
+        <a:latin typeface="+mn-lt"/>
+        <a:ea typeface="+mn-ea"/>
+        <a:cs typeface="+mn-cs"/>
+      </a:defRPr>
+    </a:lvl6pPr>
+    <a:lvl7pPr marL="2743200" algn="l" defTabSz="914400" rtl="0" eaLnBrk="1" latinLnBrk="0" hangingPunct="1">
+      <a:defRPr sz="1200" kern="1200">
+        <a:solidFill>
+          <a:schemeClr val="tx1"/>
+        </a:solidFill>
+        <a:latin typeface="+mn-lt"/>
+        <a:ea typeface="+mn-ea"/>
+        <a:cs typeface="+mn-cs"/>
+      </a:defRPr>
+    </a:lvl7pPr>
+    <a:lvl8pPr marL="3200400" algn="l" defTabSz="914400" rtl="0" eaLnBrk="1" latinLnBrk="0" hangingPunct="1">
+      <a:defRPr sz="1200" kern="1200">
+        <a:solidFill>
+          <a:schemeClr val="tx1"/>
+        </a:solidFill>
+        <a:latin typeface="+mn-lt"/>
+        <a:ea typeface="+mn-ea"/>
+        <a:cs typeface="+mn-cs"/>
+      </a:defRPr>
+    </a:lvl8pPr>
+    <a:lvl9pPr marL="3657600" algn="l" defTabSz="914400" rtl="0" eaLnBrk="1" latinLnBrk="0" hangingPunct="1">
+      <a:defRPr sz="1200" kern="1200">
+        <a:solidFill>
+          <a:schemeClr val="tx1"/>
+        </a:solidFill>
+        <a:latin typeface="+mn-lt"/>
+        <a:ea typeface="+mn-ea"/>
+        <a:cs typeface="+mn-cs"/>
+      </a:defRPr>
+    </a:lvl9pPr>
+  </p:notesStyle>
+</p:notesMaster>
+</file>
+
+<file path=ppt/notesSlides/notesSlide1.xml><?xml version="1.0" encoding="utf-8"?>
+<p:notes xmlns:a="http://schemas.openxmlformats.org/drawingml/2006/main" xmlns:r="http://schemas.openxmlformats.org/officeDocument/2006/relationships" xmlns:p="http://schemas.openxmlformats.org/presentationml/2006/main">
+  <p:cSld>
+    <p:spTree>
+      <p:nvGrpSpPr>
+        <p:cNvPr id="1" name=""/>
+        <p:cNvGrpSpPr/>
+        <p:nvPr/>
+      </p:nvGrpSpPr>
+      <p:grpSpPr>
+        <a:xfrm>
+          <a:off x="0" y="0"/>
+          <a:ext cx="0" cy="0"/>
+          <a:chOff x="0" y="0"/>
+          <a:chExt cx="0" cy="0"/>
+        </a:xfrm>
+      </p:grpSpPr>
+      <p:sp>
+        <p:nvSpPr>
+          <p:cNvPr id="2" name="Slide Image Placeholder 1"/>
+          <p:cNvSpPr>
+            <a:spLocks noGrp="1" noRot="1" noChangeAspect="1"/>
+          </p:cNvSpPr>
+          <p:nvPr>
+            <p:ph type="sldImg"/>
+          </p:nvPr>
+        </p:nvSpPr>
+        <p:spPr/>
+      </p:sp>
+      <p:sp>
+        <p:nvSpPr>
+          <p:cNvPr id="3" name="Notes Placeholder 2"/>
+          <p:cNvSpPr>
+            <a:spLocks noGrp="1"/>
+          </p:cNvSpPr>
+          <p:nvPr>
+            <p:ph type="body" idx="1"/>
+          </p:nvPr>
+        </p:nvSpPr>
+        <p:spPr/>
+        <p:txBody>
+          <a:bodyPr/>
+          <a:lstStyle/>
+          <a:p>
+            <a:pPr lvl="1"/>
+            <a:endParaRPr lang="en-US" sz="2100" dirty="0"/>
+          </a:p>
+          <a:p>
+            <a:r>
+              <a:rPr lang="en-US" sz="2600" dirty="0"/>
+              <a:t>Second model: </a:t>
+            </a:r>
+          </a:p>
+          <a:p>
+            <a:pPr lvl="1"/>
+            <a:r>
+              <a:rPr lang="en-US" sz="2100" dirty="0"/>
+              <a:t>Add to previous, variables with price correlation greater than .25 and </a:t>
+            </a:r>
+            <a:r>
+              <a:rPr lang="en-US" sz="2100" dirty="0" err="1"/>
+              <a:t>sqft_living</a:t>
+            </a:r>
+            <a:r>
+              <a:rPr lang="en-US" sz="2100" dirty="0"/>
+              <a:t> correlation less than .75 to increase </a:t>
+            </a:r>
+            <a:r>
+              <a:rPr lang="en-US" sz="2100" dirty="0" err="1"/>
+              <a:t>rsquared</a:t>
+            </a:r>
+            <a:endParaRPr lang="en-US" sz="2100" dirty="0"/>
+          </a:p>
+          <a:p>
+            <a:r>
+              <a:rPr lang="en-US" sz="2600" dirty="0"/>
+              <a:t>Third Model: </a:t>
+            </a:r>
+          </a:p>
+          <a:p>
+            <a:pPr lvl="1"/>
+            <a:r>
+              <a:rPr lang="en-US" sz="2200" dirty="0"/>
+              <a:t>Log price/</a:t>
+            </a:r>
+            <a:r>
+              <a:rPr lang="en-US" sz="2200" dirty="0" err="1"/>
+              <a:t>sqft</a:t>
+            </a:r>
+            <a:r>
+              <a:rPr lang="en-US" sz="2200" dirty="0"/>
+              <a:t> living variables</a:t>
+            </a:r>
+          </a:p>
+          <a:p>
+            <a:pPr lvl="1"/>
+            <a:r>
+              <a:rPr lang="en-US" sz="2100" dirty="0"/>
+              <a:t>Based on non-linearity issues (in residual plots and part regress) and non- normal issues in histograms</a:t>
+            </a:r>
+          </a:p>
+          <a:p>
+            <a:r>
+              <a:rPr lang="en-US" sz="2600" dirty="0"/>
+              <a:t>Fourth Model: </a:t>
+            </a:r>
+          </a:p>
+          <a:p>
+            <a:pPr lvl="1"/>
+            <a:r>
+              <a:rPr lang="en-US" sz="2100" dirty="0"/>
+              <a:t>More log </a:t>
+            </a:r>
+            <a:r>
+              <a:rPr lang="en-US" sz="2100" dirty="0" err="1"/>
+              <a:t>tranformed</a:t>
+            </a:r>
+            <a:r>
+              <a:rPr lang="en-US" sz="2100" dirty="0"/>
+              <a:t> variables (</a:t>
+            </a:r>
+            <a:r>
+              <a:rPr lang="en-US" sz="2100" dirty="0" err="1"/>
+              <a:t>sqft_patio,sqft_garage</a:t>
+            </a:r>
+            <a:r>
+              <a:rPr lang="en-US" sz="2100" dirty="0"/>
+              <a:t>)</a:t>
+            </a:r>
+          </a:p>
+          <a:p>
+            <a:endParaRPr lang="en-US" dirty="0"/>
+          </a:p>
+        </p:txBody>
+      </p:sp>
+      <p:sp>
+        <p:nvSpPr>
+          <p:cNvPr id="4" name="Slide Number Placeholder 3"/>
+          <p:cNvSpPr>
+            <a:spLocks noGrp="1"/>
+          </p:cNvSpPr>
+          <p:nvPr>
+            <p:ph type="sldNum" sz="quarter" idx="5"/>
+          </p:nvPr>
+        </p:nvSpPr>
+        <p:spPr/>
+        <p:txBody>
+          <a:bodyPr/>
+          <a:lstStyle/>
+          <a:p>
+            <a:fld id="{B3C51BA2-DF31-4A6A-B029-3C10AB406522}" type="slidenum">
+              <a:rPr lang="en-US" smtClean="0"/>
+              <a:t>4</a:t>
+            </a:fld>
+            <a:endParaRPr lang="en-US"/>
+          </a:p>
+        </p:txBody>
+      </p:sp>
+    </p:spTree>
+    <p:extLst>
+      <p:ext uri="{BB962C8B-B14F-4D97-AF65-F5344CB8AC3E}">
+        <p14:creationId xmlns:p14="http://schemas.microsoft.com/office/powerpoint/2010/main" val="1754460417"/>
+      </p:ext>
+    </p:extLst>
+  </p:cSld>
+  <p:clrMapOvr>
+    <a:masterClrMapping/>
+  </p:clrMapOvr>
+</p:notes>
+</file>
+
 <file path=ppt/slideLayouts/slideLayout1.xml><?xml version="1.0" encoding="utf-8"?>
 <p:sldLayout xmlns:a="http://schemas.openxmlformats.org/drawingml/2006/main" xmlns:r="http://schemas.openxmlformats.org/officeDocument/2006/relationships" xmlns:p="http://schemas.openxmlformats.org/presentationml/2006/main" type="title" preserve="1">
   <p:cSld name="Title Slide">
@@ -267,7 +792,7 @@
           <a:p>
             <a:fld id="{C9D5361F-08D5-4065-820A-944504E150EB}" type="datetimeFigureOut">
               <a:rPr lang="en-US" smtClean="0"/>
-              <a:t>5/17/2023</a:t>
+              <a:t>5/18/2023</a:t>
             </a:fld>
             <a:endParaRPr lang="en-US" dirty="0"/>
           </a:p>
@@ -465,7 +990,7 @@
           <a:p>
             <a:fld id="{C9D5361F-08D5-4065-820A-944504E150EB}" type="datetimeFigureOut">
               <a:rPr lang="en-US" smtClean="0"/>
-              <a:t>5/17/2023</a:t>
+              <a:t>5/18/2023</a:t>
             </a:fld>
             <a:endParaRPr lang="en-US" dirty="0"/>
           </a:p>
@@ -673,7 +1198,7 @@
           <a:p>
             <a:fld id="{C9D5361F-08D5-4065-820A-944504E150EB}" type="datetimeFigureOut">
               <a:rPr lang="en-US" smtClean="0"/>
-              <a:t>5/17/2023</a:t>
+              <a:t>5/18/2023</a:t>
             </a:fld>
             <a:endParaRPr lang="en-US" dirty="0"/>
           </a:p>
@@ -871,7 +1396,7 @@
           <a:p>
             <a:fld id="{C9D5361F-08D5-4065-820A-944504E150EB}" type="datetimeFigureOut">
               <a:rPr lang="en-US" smtClean="0"/>
-              <a:t>5/17/2023</a:t>
+              <a:t>5/18/2023</a:t>
             </a:fld>
             <a:endParaRPr lang="en-US" dirty="0"/>
           </a:p>
@@ -1146,7 +1671,7 @@
           <a:p>
             <a:fld id="{C9D5361F-08D5-4065-820A-944504E150EB}" type="datetimeFigureOut">
               <a:rPr lang="en-US" smtClean="0"/>
-              <a:t>5/17/2023</a:t>
+              <a:t>5/18/2023</a:t>
             </a:fld>
             <a:endParaRPr lang="en-US" dirty="0"/>
           </a:p>
@@ -1411,7 +1936,7 @@
           <a:p>
             <a:fld id="{C9D5361F-08D5-4065-820A-944504E150EB}" type="datetimeFigureOut">
               <a:rPr lang="en-US" smtClean="0"/>
-              <a:t>5/17/2023</a:t>
+              <a:t>5/18/2023</a:t>
             </a:fld>
             <a:endParaRPr lang="en-US" dirty="0"/>
           </a:p>
@@ -1823,7 +2348,7 @@
           <a:p>
             <a:fld id="{C9D5361F-08D5-4065-820A-944504E150EB}" type="datetimeFigureOut">
               <a:rPr lang="en-US" smtClean="0"/>
-              <a:t>5/17/2023</a:t>
+              <a:t>5/18/2023</a:t>
             </a:fld>
             <a:endParaRPr lang="en-US" dirty="0"/>
           </a:p>
@@ -1964,7 +2489,7 @@
           <a:p>
             <a:fld id="{C9D5361F-08D5-4065-820A-944504E150EB}" type="datetimeFigureOut">
               <a:rPr lang="en-US" smtClean="0"/>
-              <a:t>5/17/2023</a:t>
+              <a:t>5/18/2023</a:t>
             </a:fld>
             <a:endParaRPr lang="en-US" dirty="0"/>
           </a:p>
@@ -2077,7 +2602,7 @@
           <a:p>
             <a:fld id="{C9D5361F-08D5-4065-820A-944504E150EB}" type="datetimeFigureOut">
               <a:rPr lang="en-US" smtClean="0"/>
-              <a:t>5/17/2023</a:t>
+              <a:t>5/18/2023</a:t>
             </a:fld>
             <a:endParaRPr lang="en-US" dirty="0"/>
           </a:p>
@@ -2388,7 +2913,7 @@
           <a:p>
             <a:fld id="{C9D5361F-08D5-4065-820A-944504E150EB}" type="datetimeFigureOut">
               <a:rPr lang="en-US" smtClean="0"/>
-              <a:t>5/17/2023</a:t>
+              <a:t>5/18/2023</a:t>
             </a:fld>
             <a:endParaRPr lang="en-US" dirty="0"/>
           </a:p>
@@ -2676,7 +3201,7 @@
           <a:p>
             <a:fld id="{C9D5361F-08D5-4065-820A-944504E150EB}" type="datetimeFigureOut">
               <a:rPr lang="en-US" smtClean="0"/>
-              <a:t>5/17/2023</a:t>
+              <a:t>5/18/2023</a:t>
             </a:fld>
             <a:endParaRPr lang="en-US" dirty="0"/>
           </a:p>
@@ -2917,7 +3442,7 @@
           <a:p>
             <a:fld id="{C9D5361F-08D5-4065-820A-944504E150EB}" type="datetimeFigureOut">
               <a:rPr lang="en-US" smtClean="0"/>
-              <a:t>5/17/2023</a:t>
+              <a:t>5/18/2023</a:t>
             </a:fld>
             <a:endParaRPr lang="en-US" dirty="0"/>
           </a:p>
@@ -3624,6 +4149,192 @@
 </p:sld>
 </file>
 
+<file path=ppt/slides/slide10.xml><?xml version="1.0" encoding="utf-8"?>
+<p:sld xmlns:a="http://schemas.openxmlformats.org/drawingml/2006/main" xmlns:r="http://schemas.openxmlformats.org/officeDocument/2006/relationships" xmlns:p="http://schemas.openxmlformats.org/presentationml/2006/main">
+  <p:cSld>
+    <p:spTree>
+      <p:nvGrpSpPr>
+        <p:cNvPr id="1" name=""/>
+        <p:cNvGrpSpPr/>
+        <p:nvPr/>
+      </p:nvGrpSpPr>
+      <p:grpSpPr>
+        <a:xfrm>
+          <a:off x="0" y="0"/>
+          <a:ext cx="0" cy="0"/>
+          <a:chOff x="0" y="0"/>
+          <a:chExt cx="0" cy="0"/>
+        </a:xfrm>
+      </p:grpSpPr>
+      <p:sp>
+        <p:nvSpPr>
+          <p:cNvPr id="2" name="Title 1">
+            <a:extLst>
+              <a:ext uri="{FF2B5EF4-FFF2-40B4-BE49-F238E27FC236}">
+                <a16:creationId xmlns:a16="http://schemas.microsoft.com/office/drawing/2014/main" id="{359D515C-3C6F-C4EA-606F-A45E20C7B2C5}"/>
+              </a:ext>
+            </a:extLst>
+          </p:cNvPr>
+          <p:cNvSpPr>
+            <a:spLocks noGrp="1"/>
+          </p:cNvSpPr>
+          <p:nvPr>
+            <p:ph type="title"/>
+          </p:nvPr>
+        </p:nvSpPr>
+        <p:spPr/>
+        <p:txBody>
+          <a:bodyPr/>
+          <a:lstStyle/>
+          <a:p>
+            <a:r>
+              <a:rPr lang="en-US" dirty="0"/>
+              <a:t>Next Steps</a:t>
+            </a:r>
+          </a:p>
+        </p:txBody>
+      </p:sp>
+      <p:sp>
+        <p:nvSpPr>
+          <p:cNvPr id="3" name="Content Placeholder 2">
+            <a:extLst>
+              <a:ext uri="{FF2B5EF4-FFF2-40B4-BE49-F238E27FC236}">
+                <a16:creationId xmlns:a16="http://schemas.microsoft.com/office/drawing/2014/main" id="{5A5045E2-C6E2-0810-38F3-9B7D8DE6B1FC}"/>
+              </a:ext>
+            </a:extLst>
+          </p:cNvPr>
+          <p:cNvSpPr>
+            <a:spLocks noGrp="1"/>
+          </p:cNvSpPr>
+          <p:nvPr>
+            <p:ph idx="1"/>
+          </p:nvPr>
+        </p:nvSpPr>
+        <p:spPr>
+          <a:xfrm>
+            <a:off x="838200" y="1825625"/>
+            <a:ext cx="10515600" cy="4351338"/>
+          </a:xfrm>
+        </p:spPr>
+        <p:txBody>
+          <a:bodyPr/>
+          <a:lstStyle/>
+          <a:p>
+            <a:r>
+              <a:rPr lang="en-US" dirty="0"/>
+              <a:t>Establish a better interpretation of the root mean squared error. </a:t>
+            </a:r>
+          </a:p>
+          <a:p>
+            <a:r>
+              <a:rPr lang="en-US" dirty="0"/>
+              <a:t>Further analyze the negative coefficient of garage size variable.</a:t>
+            </a:r>
+          </a:p>
+          <a:p>
+            <a:r>
+              <a:rPr lang="en-US" dirty="0"/>
+              <a:t>Testing interaction variables (e.g. differing lot sizes and house sizes for different geographic areas.)</a:t>
+            </a:r>
+          </a:p>
+        </p:txBody>
+      </p:sp>
+    </p:spTree>
+    <p:extLst>
+      <p:ext uri="{BB962C8B-B14F-4D97-AF65-F5344CB8AC3E}">
+        <p14:creationId xmlns:p14="http://schemas.microsoft.com/office/powerpoint/2010/main" val="1463815278"/>
+      </p:ext>
+    </p:extLst>
+  </p:cSld>
+  <p:clrMapOvr>
+    <a:masterClrMapping/>
+  </p:clrMapOvr>
+</p:sld>
+</file>
+
+<file path=ppt/slides/slide11.xml><?xml version="1.0" encoding="utf-8"?>
+<p:sld xmlns:a="http://schemas.openxmlformats.org/drawingml/2006/main" xmlns:r="http://schemas.openxmlformats.org/officeDocument/2006/relationships" xmlns:p="http://schemas.openxmlformats.org/presentationml/2006/main">
+  <p:cSld>
+    <p:spTree>
+      <p:nvGrpSpPr>
+        <p:cNvPr id="1" name=""/>
+        <p:cNvGrpSpPr/>
+        <p:nvPr/>
+      </p:nvGrpSpPr>
+      <p:grpSpPr>
+        <a:xfrm>
+          <a:off x="0" y="0"/>
+          <a:ext cx="0" cy="0"/>
+          <a:chOff x="0" y="0"/>
+          <a:chExt cx="0" cy="0"/>
+        </a:xfrm>
+      </p:grpSpPr>
+      <p:sp>
+        <p:nvSpPr>
+          <p:cNvPr id="2" name="Title 1">
+            <a:extLst>
+              <a:ext uri="{FF2B5EF4-FFF2-40B4-BE49-F238E27FC236}">
+                <a16:creationId xmlns:a16="http://schemas.microsoft.com/office/drawing/2014/main" id="{A9F28CAC-4072-3078-91BE-AA151AF3DE25}"/>
+              </a:ext>
+            </a:extLst>
+          </p:cNvPr>
+          <p:cNvSpPr>
+            <a:spLocks noGrp="1"/>
+          </p:cNvSpPr>
+          <p:nvPr>
+            <p:ph type="title"/>
+          </p:nvPr>
+        </p:nvSpPr>
+        <p:spPr/>
+        <p:txBody>
+          <a:bodyPr/>
+          <a:lstStyle/>
+          <a:p>
+            <a:r>
+              <a:rPr lang="en-US" dirty="0"/>
+              <a:t>Thank you/Questions?</a:t>
+            </a:r>
+          </a:p>
+        </p:txBody>
+      </p:sp>
+      <p:sp>
+        <p:nvSpPr>
+          <p:cNvPr id="3" name="Content Placeholder 2">
+            <a:extLst>
+              <a:ext uri="{FF2B5EF4-FFF2-40B4-BE49-F238E27FC236}">
+                <a16:creationId xmlns:a16="http://schemas.microsoft.com/office/drawing/2014/main" id="{AB42E343-1351-D256-E2C3-D9DB6AA6E176}"/>
+              </a:ext>
+            </a:extLst>
+          </p:cNvPr>
+          <p:cNvSpPr>
+            <a:spLocks noGrp="1"/>
+          </p:cNvSpPr>
+          <p:nvPr>
+            <p:ph idx="1"/>
+          </p:nvPr>
+        </p:nvSpPr>
+        <p:spPr/>
+        <p:txBody>
+          <a:bodyPr/>
+          <a:lstStyle/>
+          <a:p>
+            <a:endParaRPr lang="en-US" dirty="0"/>
+          </a:p>
+        </p:txBody>
+      </p:sp>
+    </p:spTree>
+    <p:extLst>
+      <p:ext uri="{BB962C8B-B14F-4D97-AF65-F5344CB8AC3E}">
+        <p14:creationId xmlns:p14="http://schemas.microsoft.com/office/powerpoint/2010/main" val="1924136096"/>
+      </p:ext>
+    </p:extLst>
+  </p:cSld>
+  <p:clrMapOvr>
+    <a:masterClrMapping/>
+  </p:clrMapOvr>
+</p:sld>
+</file>
+
 <file path=ppt/slides/slide2.xml><?xml version="1.0" encoding="utf-8"?>
 <p:sld xmlns:a="http://schemas.openxmlformats.org/drawingml/2006/main" xmlns:r="http://schemas.openxmlformats.org/officeDocument/2006/relationships" xmlns:p="http://schemas.openxmlformats.org/presentationml/2006/main">
   <p:cSld>
@@ -4242,7 +4953,7 @@
         </p:nvSpPr>
         <p:spPr>
           <a:xfrm>
-            <a:off x="686834" y="1153572"/>
+            <a:off x="587993" y="470693"/>
             <a:ext cx="3200400" cy="4461163"/>
           </a:xfrm>
         </p:spPr>
@@ -4342,7 +5053,7 @@
         </p:nvSpPr>
         <p:spPr>
           <a:xfrm>
-            <a:off x="4386348" y="-71120"/>
+            <a:off x="4326685" y="-653763"/>
             <a:ext cx="6906491" cy="5585619"/>
           </a:xfrm>
         </p:spPr>
@@ -4353,23 +5064,25 @@
           <a:lstStyle/>
           <a:p>
             <a:r>
-              <a:rPr lang="en-US" sz="2400" dirty="0"/>
-              <a:t>Housing data from a Northwestern county and from the county government. </a:t>
-            </a:r>
-          </a:p>
-          <a:p>
-            <a:r>
               <a:rPr lang="en-US" sz="2400" dirty="0">
                 <a:latin typeface="+mj-lt"/>
               </a:rPr>
-              <a:t>Key data categories include </a:t>
+              <a:t>Housing data from a Northwestern county. </a:t>
+            </a:r>
+          </a:p>
+          <a:p>
+            <a:r>
+              <a:rPr lang="en-US" sz="2400" dirty="0">
+                <a:latin typeface="+mj-lt"/>
+              </a:rPr>
+              <a:t>Key variables: </a:t>
             </a:r>
             <a:r>
               <a:rPr lang="en-US" sz="2400" b="0" i="0" dirty="0">
                 <a:effectLst/>
                 <a:latin typeface="+mj-lt"/>
               </a:rPr>
-              <a:t>price, number of rooms, various square footage metrics, and age of the house</a:t>
+              <a:t>price, square footage and quality</a:t>
             </a:r>
             <a:r>
               <a:rPr lang="en-US" sz="2400" dirty="0">
@@ -4409,7 +5122,16 @@
               <a:rPr lang="en-US" sz="2400" dirty="0">
                 <a:latin typeface="+mj-lt"/>
               </a:rPr>
-              <a:t>nearly all observations within Greater Seattle</a:t>
+              <a:t>nearly all observations within Greater Seattle, outliers cut.</a:t>
+            </a:r>
+          </a:p>
+          <a:p>
+            <a:pPr lvl="1"/>
+            <a:r>
+              <a:rPr lang="en-US" sz="2000" dirty="0">
+                <a:latin typeface="+mj-lt"/>
+              </a:rPr>
+              <a:t>high price center zone</a:t>
             </a:r>
           </a:p>
           <a:p>
@@ -4421,10 +5143,10 @@
       </p:sp>
       <p:pic>
         <p:nvPicPr>
-          <p:cNvPr id="2050" name="Picture 2">
-            <a:extLst>
-              <a:ext uri="{FF2B5EF4-FFF2-40B4-BE49-F238E27FC236}">
-                <a16:creationId xmlns:a16="http://schemas.microsoft.com/office/drawing/2014/main" id="{D98BEB82-A1D7-1C6B-1F27-BDAFED3215E3}"/>
+          <p:cNvPr id="4" name="Picture 2">
+            <a:extLst>
+              <a:ext uri="{FF2B5EF4-FFF2-40B4-BE49-F238E27FC236}">
+                <a16:creationId xmlns:a16="http://schemas.microsoft.com/office/drawing/2014/main" id="{6A69DFA3-B52C-C2F9-6333-09734427F1A6}"/>
               </a:ext>
             </a:extLst>
           </p:cNvPr>
@@ -4448,55 +5170,8 @@
         </p:blipFill>
         <p:spPr bwMode="auto">
           <a:xfrm>
-            <a:off x="4045352" y="4294089"/>
-            <a:ext cx="3434080" cy="2635031"/>
-          </a:xfrm>
-          <a:prstGeom prst="rect">
-            <a:avLst/>
-          </a:prstGeom>
-          <a:noFill/>
-          <a:extLst>
-            <a:ext uri="{909E8E84-426E-40DD-AFC4-6F175D3DCCD1}">
-              <a14:hiddenFill xmlns:a14="http://schemas.microsoft.com/office/drawing/2010/main">
-                <a:solidFill>
-                  <a:srgbClr val="FFFFFF"/>
-                </a:solidFill>
-              </a14:hiddenFill>
-            </a:ext>
-          </a:extLst>
-        </p:spPr>
-      </p:pic>
-      <p:pic>
-        <p:nvPicPr>
-          <p:cNvPr id="1026" name="Picture 2">
-            <a:extLst>
-              <a:ext uri="{FF2B5EF4-FFF2-40B4-BE49-F238E27FC236}">
-                <a16:creationId xmlns:a16="http://schemas.microsoft.com/office/drawing/2014/main" id="{0788188C-6D1C-7782-DE4F-E51B1DA30793}"/>
-              </a:ext>
-            </a:extLst>
-          </p:cNvPr>
-          <p:cNvPicPr>
-            <a:picLocks noChangeAspect="1" noChangeArrowheads="1"/>
-          </p:cNvPicPr>
-          <p:nvPr/>
-        </p:nvPicPr>
-        <p:blipFill>
-          <a:blip r:embed="rId3">
-            <a:extLst>
-              <a:ext uri="{28A0092B-C50C-407E-A947-70E740481C1C}">
-                <a14:useLocalDpi xmlns:a14="http://schemas.microsoft.com/office/drawing/2010/main" val="0"/>
-              </a:ext>
-            </a:extLst>
-          </a:blip>
-          <a:srcRect/>
-          <a:stretch>
-            <a:fillRect/>
-          </a:stretch>
-        </p:blipFill>
-        <p:spPr bwMode="auto">
-          <a:xfrm>
-            <a:off x="7637550" y="4291781"/>
-            <a:ext cx="3297084" cy="2472813"/>
+            <a:off x="7550402" y="3226150"/>
+            <a:ext cx="4492490" cy="3524756"/>
           </a:xfrm>
           <a:prstGeom prst="rect">
             <a:avLst/>
@@ -4779,7 +5454,7 @@
                   <a:srgbClr val="FFFFFF"/>
                 </a:solidFill>
               </a:rPr>
-              <a:t>Modelling Overview</a:t>
+              <a:t>Modelling Overview: Linear regressions</a:t>
             </a:r>
           </a:p>
         </p:txBody>
@@ -4869,7 +5544,7 @@
         </p:spPr>
         <p:txBody>
           <a:bodyPr anchor="ctr">
-            <a:normAutofit fontScale="85000" lnSpcReduction="20000"/>
+            <a:normAutofit/>
           </a:bodyPr>
           <a:lstStyle/>
           <a:p>
@@ -4901,97 +5576,35 @@
           </a:p>
           <a:p>
             <a:r>
-              <a:rPr lang="en-US" sz="2600" dirty="0"/>
-              <a:t>Second model: </a:t>
+              <a:rPr lang="en-US" sz="2500" dirty="0"/>
+              <a:t>Intermediate models:</a:t>
             </a:r>
           </a:p>
           <a:p>
             <a:pPr lvl="1"/>
             <a:r>
               <a:rPr lang="en-US" sz="2100" dirty="0"/>
-              <a:t>Add to previous, variables with price correlation greater than .25 and sqft_living correlation less than .75 to increase </a:t>
+              <a:t>Add new numeric variables and conservatively log transform move variables with each iteration.</a:t>
+            </a:r>
+          </a:p>
+          <a:p>
+            <a:pPr lvl="1"/>
+            <a:r>
+              <a:rPr lang="en-US" sz="2100" dirty="0"/>
+              <a:t>to improve on linearity issue and </a:t>
+            </a:r>
+            <a:r>
+              <a:rPr lang="en-US" sz="2100" dirty="0" err="1"/>
+              <a:t>heteroskedaticity</a:t>
+            </a:r>
+            <a:r>
+              <a:rPr lang="en-US" sz="2100" dirty="0"/>
+              <a:t> issues and non-normality issues and to improve </a:t>
             </a:r>
             <a:r>
               <a:rPr lang="en-US" sz="2100" dirty="0" err="1"/>
               <a:t>rsquared</a:t>
             </a:r>
-            <a:endParaRPr lang="en-US" sz="2100" dirty="0"/>
-          </a:p>
-          <a:p>
-            <a:r>
-              <a:rPr lang="en-US" sz="2600" dirty="0"/>
-              <a:t>Third Model: </a:t>
-            </a:r>
-          </a:p>
-          <a:p>
-            <a:pPr lvl="1"/>
-            <a:r>
-              <a:rPr lang="en-US" sz="2200" dirty="0"/>
-              <a:t>Log price/</a:t>
-            </a:r>
-            <a:r>
-              <a:rPr lang="en-US" sz="2200" dirty="0" err="1"/>
-              <a:t>sqft</a:t>
-            </a:r>
-            <a:r>
-              <a:rPr lang="en-US" sz="2200" dirty="0"/>
-              <a:t> living variables</a:t>
-            </a:r>
-          </a:p>
-          <a:p>
-            <a:pPr lvl="1"/>
-            <a:r>
-              <a:rPr lang="en-US" sz="2100" dirty="0"/>
-              <a:t>Based on non-linearity issues (in residual plots and part regress) and non- normal issues in histograms</a:t>
-            </a:r>
-          </a:p>
-          <a:p>
-            <a:r>
-              <a:rPr lang="en-US" sz="2600" dirty="0"/>
-              <a:t>Fourth Model: </a:t>
-            </a:r>
-          </a:p>
-          <a:p>
-            <a:pPr lvl="1"/>
-            <a:r>
-              <a:rPr lang="en-US" sz="2100" dirty="0"/>
-              <a:t>More log </a:t>
-            </a:r>
-            <a:r>
-              <a:rPr lang="en-US" sz="2100" dirty="0" err="1"/>
-              <a:t>tranformed</a:t>
-            </a:r>
-            <a:r>
-              <a:rPr lang="en-US" sz="2100" dirty="0"/>
-              <a:t> variables (</a:t>
-            </a:r>
-            <a:r>
-              <a:rPr lang="en-US" sz="2100" dirty="0" err="1"/>
-              <a:t>sqft_patio,sqft_garage</a:t>
-            </a:r>
-            <a:r>
-              <a:rPr lang="en-US" sz="2100" dirty="0"/>
-              <a:t>)</a:t>
-            </a:r>
-          </a:p>
-          <a:p>
-            <a:pPr lvl="1"/>
-            <a:r>
-              <a:rPr lang="en-US" sz="2100" dirty="0"/>
-              <a:t> to improve on linearity issue and </a:t>
-            </a:r>
-            <a:r>
-              <a:rPr lang="en-US" sz="2100" dirty="0" err="1"/>
-              <a:t>heteroskedaticity</a:t>
-            </a:r>
-            <a:r>
-              <a:rPr lang="en-US" sz="2100" dirty="0"/>
-              <a:t> issues and non-normality issues and to improve </a:t>
-            </a:r>
-            <a:r>
-              <a:rPr lang="en-US" sz="2100" dirty="0" err="1"/>
-              <a:t>rsquared</a:t>
-            </a:r>
             <a:r>
               <a:rPr lang="en-US" sz="2100" dirty="0"/>
               <a:t>.</a:t>
@@ -5014,7 +5627,7 @@
             <a:pPr lvl="1"/>
             <a:r>
               <a:rPr lang="en-US" sz="2100" dirty="0"/>
-              <a:t>Add categorical variable, Waterfront, to increase </a:t>
+              <a:t>Add categorical variables Waterfront and Jumbo to increase </a:t>
             </a:r>
             <a:r>
               <a:rPr lang="en-US" sz="2100" dirty="0" err="1"/>
@@ -5305,7 +5918,7 @@
                   <a:srgbClr val="FFFFFF"/>
                 </a:solidFill>
               </a:rPr>
-              <a:t>Results of iterative model process</a:t>
+              <a:t>Linear regression model assumptions</a:t>
             </a:r>
           </a:p>
         </p:txBody>
@@ -5389,7 +6002,7 @@
         </p:nvSpPr>
         <p:spPr>
           <a:xfrm>
-            <a:off x="4447308" y="591344"/>
+            <a:off x="4447308" y="581512"/>
             <a:ext cx="6906491" cy="5585619"/>
           </a:xfrm>
         </p:spPr>
@@ -5433,7 +6046,7 @@
           <a:p>
             <a:r>
               <a:rPr lang="en-US" sz="2400" dirty="0"/>
-              <a:t>Residual plot appears normally distributed, and is improved from previous model, however J-B test still failed suggesting non-normality.</a:t>
+              <a:t>Residual histogram appears normally distributed, and is improved from previous model, however J-B test still failed suggesting non-normality.</a:t>
             </a:r>
           </a:p>
           <a:p>
@@ -5803,7 +6416,7 @@
           <a:p>
             <a:r>
               <a:rPr lang="en-US" sz="2600" dirty="0"/>
-              <a:t>Final model</a:t>
+              <a:t>Final model &amp; Results</a:t>
             </a:r>
             <a:endParaRPr lang="en-US" sz="2600" dirty="0">
               <a:solidFill>
@@ -5874,45 +6487,65 @@
           </a:p>
         </p:txBody>
       </p:sp>
+      <p:sp>
+        <p:nvSpPr>
+          <p:cNvPr id="20" name="Content Placeholder 19">
+            <a:extLst>
+              <a:ext uri="{FF2B5EF4-FFF2-40B4-BE49-F238E27FC236}">
+                <a16:creationId xmlns:a16="http://schemas.microsoft.com/office/drawing/2014/main" id="{FB9E7D46-F735-CFBC-A86B-F4333FE7E082}"/>
+              </a:ext>
+            </a:extLst>
+          </p:cNvPr>
+          <p:cNvSpPr>
+            <a:spLocks noGrp="1"/>
+          </p:cNvSpPr>
+          <p:nvPr>
+            <p:ph idx="1"/>
+          </p:nvPr>
+        </p:nvSpPr>
+        <p:spPr/>
+        <p:txBody>
+          <a:bodyPr/>
+          <a:lstStyle/>
+          <a:p>
+            <a:endParaRPr lang="en-US" dirty="0"/>
+          </a:p>
+        </p:txBody>
+      </p:sp>
       <p:pic>
         <p:nvPicPr>
-          <p:cNvPr id="5" name="Content Placeholder 4" descr="A screenshot of a computer&#10;&#10;Description automatically generated with medium confidence">
-            <a:extLst>
-              <a:ext uri="{FF2B5EF4-FFF2-40B4-BE49-F238E27FC236}">
-                <a16:creationId xmlns:a16="http://schemas.microsoft.com/office/drawing/2014/main" id="{FBFBD64E-9305-34AB-9E5B-8B53D5D121FF}"/>
+          <p:cNvPr id="5" name="Picture 4">
+            <a:extLst>
+              <a:ext uri="{FF2B5EF4-FFF2-40B4-BE49-F238E27FC236}">
+                <a16:creationId xmlns:a16="http://schemas.microsoft.com/office/drawing/2014/main" id="{532B8471-FA7E-7EFA-5DFC-2C157DDACFE6}"/>
               </a:ext>
             </a:extLst>
           </p:cNvPr>
           <p:cNvPicPr>
-            <a:picLocks noGrp="1" noChangeAspect="1"/>
+            <a:picLocks noChangeAspect="1"/>
           </p:cNvPicPr>
-          <p:nvPr>
-            <p:ph idx="1"/>
-          </p:nvPr>
+          <p:nvPr/>
         </p:nvPicPr>
         <p:blipFill>
-          <a:blip r:embed="rId2">
-            <a:extLst>
-              <a:ext uri="{28A0092B-C50C-407E-A947-70E740481C1C}">
-                <a14:useLocalDpi xmlns:a14="http://schemas.microsoft.com/office/drawing/2010/main" val="0"/>
-              </a:ext>
-            </a:extLst>
-          </a:blip>
+          <a:blip r:embed="rId2"/>
           <a:stretch>
             <a:fillRect/>
           </a:stretch>
         </p:blipFill>
         <p:spPr>
           <a:xfrm>
-            <a:off x="5033875" y="523641"/>
-            <a:ext cx="5127161" cy="5763793"/>
+            <a:off x="5172285" y="319088"/>
+            <a:ext cx="4756233" cy="6023178"/>
           </a:xfrm>
+          <a:prstGeom prst="rect">
+            <a:avLst/>
+          </a:prstGeom>
         </p:spPr>
       </p:pic>
     </p:spTree>
     <p:extLst>
       <p:ext uri="{BB962C8B-B14F-4D97-AF65-F5344CB8AC3E}">
-        <p14:creationId xmlns:p14="http://schemas.microsoft.com/office/powerpoint/2010/main" val="38252150"/>
+        <p14:creationId xmlns:p14="http://schemas.microsoft.com/office/powerpoint/2010/main" val="2926314233"/>
       </p:ext>
     </p:extLst>
   </p:cSld>
@@ -5962,7 +6595,7 @@
           <a:p>
             <a:r>
               <a:rPr lang="en-US" dirty="0"/>
-              <a:t>Results</a:t>
+              <a:t>Results contd.</a:t>
             </a:r>
           </a:p>
         </p:txBody>
@@ -5986,7 +6619,7 @@
         <p:spPr/>
         <p:txBody>
           <a:bodyPr>
-            <a:normAutofit fontScale="92500" lnSpcReduction="10000"/>
+            <a:normAutofit/>
           </a:bodyPr>
           <a:lstStyle/>
           <a:p>
@@ -5998,110 +6631,84 @@
           <a:p>
             <a:pPr lvl="1"/>
             <a:r>
-              <a:rPr lang="en-US" b="1" dirty="0" err="1"/>
+              <a:rPr lang="en-US" dirty="0" err="1"/>
               <a:t>Rsq</a:t>
             </a:r>
             <a:r>
+              <a:rPr lang="en-US" dirty="0"/>
+              <a:t>:</a:t>
+            </a:r>
+            <a:r>
               <a:rPr lang="en-US" b="1" dirty="0"/>
-              <a:t> is 0.49</a:t>
-            </a:r>
+              <a:t> 0.51</a:t>
+            </a:r>
+            <a:endParaRPr lang="en-US" dirty="0"/>
+          </a:p>
+          <a:p>
+            <a:pPr lvl="2"/>
             <a:r>
               <a:rPr lang="en-US" dirty="0"/>
-              <a:t> compared to baseline of  0.38 and previous model of 0.46. This means the model accounts for </a:t>
+              <a:t> This means the model accounts for </a:t>
             </a:r>
             <a:r>
               <a:rPr lang="en-US" b="1" dirty="0"/>
-              <a:t>49%</a:t>
+              <a:t>51% of the variation</a:t>
             </a:r>
             <a:r>
               <a:rPr lang="en-US" dirty="0"/>
-              <a:t> of the variation in the dependent variable.</a:t>
+              <a:t> in the dependent variable.</a:t>
+            </a:r>
+          </a:p>
+          <a:p>
+            <a:pPr lvl="2"/>
+            <a:r>
+              <a:rPr lang="en-US" dirty="0"/>
+              <a:t>Compared to baseline model of  0.38.</a:t>
+            </a:r>
+          </a:p>
+          <a:p>
+            <a:pPr lvl="1"/>
+            <a:r>
+              <a:rPr lang="en-US" dirty="0"/>
+              <a:t>Mean squared error: </a:t>
+            </a:r>
+            <a:r>
+              <a:rPr lang="en-US" b="1" dirty="0"/>
+              <a:t>0.41.</a:t>
+            </a:r>
+            <a:r>
+              <a:rPr lang="en-US" dirty="0"/>
+              <a:t>  </a:t>
+            </a:r>
+          </a:p>
+          <a:p>
+            <a:pPr lvl="2"/>
+            <a:r>
+              <a:rPr lang="en-US" dirty="0"/>
+              <a:t>This is a measure of how far off the predictions of log(price) are from the actual log(price).</a:t>
+            </a:r>
+          </a:p>
+          <a:p>
+            <a:pPr lvl="1"/>
+            <a:r>
+              <a:rPr lang="en-US" dirty="0"/>
+              <a:t>Root mean squared error: </a:t>
+            </a:r>
+            <a:r>
+              <a:rPr lang="en-US" b="1" dirty="0"/>
+              <a:t>0.64</a:t>
+            </a:r>
+          </a:p>
+          <a:p>
+            <a:pPr lvl="2"/>
+            <a:r>
+              <a:rPr lang="en-US" dirty="0"/>
+              <a:t> This is about the average of how far off the predictions of log(price) are from the actual log(price).</a:t>
             </a:r>
           </a:p>
           <a:p>
             <a:pPr lvl="1"/>
             <a:endParaRPr lang="en-US" dirty="0"/>
-          </a:p>
-          <a:p>
-            <a:pPr lvl="1"/>
-            <a:r>
-              <a:rPr lang="en-US" dirty="0"/>
-              <a:t>The mean squared error of the model is about </a:t>
-            </a:r>
-            <a:r>
-              <a:rPr lang="en-US" b="1" dirty="0"/>
-              <a:t>0.42.</a:t>
-            </a:r>
-            <a:r>
-              <a:rPr lang="en-US" dirty="0"/>
-              <a:t>  This is a measure of how far off the predictions of log(price) are from the actual log(price).</a:t>
-            </a:r>
-          </a:p>
-          <a:p>
-            <a:pPr lvl="1"/>
-            <a:endParaRPr lang="en-US" dirty="0"/>
-          </a:p>
-          <a:p>
-            <a:r>
-              <a:rPr lang="en-US" dirty="0"/>
-              <a:t>Interpretation of coefficients: All six predictor variables significant</a:t>
-            </a:r>
-          </a:p>
-          <a:p>
-            <a:endParaRPr lang="en-US" dirty="0"/>
-          </a:p>
-          <a:p>
-            <a:pPr lvl="1"/>
-            <a:r>
-              <a:rPr lang="en-US" dirty="0" err="1"/>
-              <a:t>WaterFront</a:t>
-            </a:r>
-            <a:r>
-              <a:rPr lang="en-US" dirty="0"/>
-              <a:t> properties: </a:t>
-            </a:r>
-            <a:r>
-              <a:rPr lang="en-US" b="1" dirty="0"/>
-              <a:t>39.68% in price</a:t>
-            </a:r>
-          </a:p>
-          <a:p>
-            <a:pPr lvl="1"/>
-            <a:r>
-              <a:rPr lang="en-US" dirty="0"/>
-              <a:t>For each 1% increase in </a:t>
-            </a:r>
-            <a:r>
-              <a:rPr lang="en-US" dirty="0" err="1"/>
-              <a:t>grade_num_log</a:t>
-            </a:r>
-            <a:r>
-              <a:rPr lang="en-US" dirty="0"/>
-              <a:t>: </a:t>
-            </a:r>
-            <a:r>
-              <a:rPr lang="en-US" b="1" dirty="0"/>
-              <a:t>1.78% in price</a:t>
-            </a:r>
-          </a:p>
-          <a:p>
-            <a:pPr lvl="1"/>
-            <a:r>
-              <a:rPr lang="en-US" dirty="0"/>
-              <a:t>For each 1% increase in </a:t>
-            </a:r>
-            <a:r>
-              <a:rPr lang="en-US" dirty="0" err="1"/>
-              <a:t>sqft_living_log</a:t>
-            </a:r>
-            <a:r>
-              <a:rPr lang="en-US" dirty="0"/>
-              <a:t>:</a:t>
-            </a:r>
-            <a:r>
-              <a:rPr lang="en-US" b="1" dirty="0"/>
-              <a:t> 0.50% in price</a:t>
-            </a:r>
           </a:p>
         </p:txBody>
       </p:sp>
@@ -6140,7 +6747,7 @@
           <p:cNvPr id="2" name="Title 1">
             <a:extLst>
               <a:ext uri="{FF2B5EF4-FFF2-40B4-BE49-F238E27FC236}">
-                <a16:creationId xmlns:a16="http://schemas.microsoft.com/office/drawing/2014/main" id="{359D515C-3C6F-C4EA-606F-A45E20C7B2C5}"/>
+                <a16:creationId xmlns:a16="http://schemas.microsoft.com/office/drawing/2014/main" id="{69963B92-A737-1B3F-F897-5B7E8D7F8EB3}"/>
               </a:ext>
             </a:extLst>
           </p:cNvPr>
@@ -6151,72 +6758,65 @@
             <p:ph type="title"/>
           </p:nvPr>
         </p:nvSpPr>
-        <p:spPr/>
+        <p:spPr>
+          <a:xfrm>
+            <a:off x="848032" y="365125"/>
+            <a:ext cx="10515600" cy="1325563"/>
+          </a:xfrm>
+        </p:spPr>
         <p:txBody>
           <a:bodyPr/>
           <a:lstStyle/>
           <a:p>
             <a:r>
               <a:rPr lang="en-US" dirty="0"/>
-              <a:t>Next Steps</a:t>
-            </a:r>
-          </a:p>
-        </p:txBody>
-      </p:sp>
-      <p:sp>
-        <p:nvSpPr>
-          <p:cNvPr id="3" name="Content Placeholder 2">
-            <a:extLst>
-              <a:ext uri="{FF2B5EF4-FFF2-40B4-BE49-F238E27FC236}">
-                <a16:creationId xmlns:a16="http://schemas.microsoft.com/office/drawing/2014/main" id="{5A5045E2-C6E2-0810-38F3-9B7D8DE6B1FC}"/>
-              </a:ext>
-            </a:extLst>
-          </p:cNvPr>
-          <p:cNvSpPr>
-            <a:spLocks noGrp="1"/>
-          </p:cNvSpPr>
+              <a:t>Interpretation of Coefficients</a:t>
+            </a:r>
+          </a:p>
+        </p:txBody>
+      </p:sp>
+      <p:pic>
+        <p:nvPicPr>
+          <p:cNvPr id="4" name="Content Placeholder 3" descr="A picture containing text, screenshot, number, font">
+            <a:extLst>
+              <a:ext uri="{FF2B5EF4-FFF2-40B4-BE49-F238E27FC236}">
+                <a16:creationId xmlns:a16="http://schemas.microsoft.com/office/drawing/2014/main" id="{F9B37FEB-BA40-600D-E8ED-59C60EB34FE3}"/>
+              </a:ext>
+            </a:extLst>
+          </p:cNvPr>
+          <p:cNvPicPr>
+            <a:picLocks noGrp="1" noChangeAspect="1"/>
+          </p:cNvPicPr>
           <p:nvPr>
             <p:ph idx="1"/>
           </p:nvPr>
-        </p:nvSpPr>
-        <p:spPr/>
-        <p:txBody>
-          <a:bodyPr/>
-          <a:lstStyle/>
-          <a:p>
-            <a:r>
-              <a:rPr lang="en-US" dirty="0"/>
-              <a:t>Try to improve on </a:t>
-            </a:r>
-            <a:r>
-              <a:rPr lang="en-US" dirty="0" err="1"/>
-              <a:t>rsquared</a:t>
-            </a:r>
-            <a:r>
-              <a:rPr lang="en-US" dirty="0"/>
-              <a:t>/reduce small non-linearity by using the </a:t>
-            </a:r>
-            <a:r>
-              <a:rPr lang="en-US" dirty="0" err="1"/>
-              <a:t>lat</a:t>
-            </a:r>
-            <a:r>
-              <a:rPr lang="en-US" dirty="0"/>
-              <a:t>/long scatter map to create dummy variables for specific geographic areas (would likely be about 10). </a:t>
-            </a:r>
-          </a:p>
-          <a:p>
-            <a:r>
-              <a:rPr lang="en-US" dirty="0"/>
-              <a:t>Testing interaction variables (e.g. differing lot sizes and house sizes for different geographic areas.)</a:t>
-            </a:r>
-          </a:p>
-        </p:txBody>
-      </p:sp>
+        </p:nvPicPr>
+        <p:blipFill>
+          <a:blip r:embed="rId2">
+            <a:extLst>
+              <a:ext uri="{28A0092B-C50C-407E-A947-70E740481C1C}">
+                <a14:useLocalDpi xmlns:a14="http://schemas.microsoft.com/office/drawing/2010/main" val="0"/>
+              </a:ext>
+            </a:extLst>
+          </a:blip>
+          <a:stretch>
+            <a:fillRect/>
+          </a:stretch>
+        </p:blipFill>
+        <p:spPr>
+          <a:xfrm>
+            <a:off x="1966452" y="1887794"/>
+            <a:ext cx="7760262" cy="4517379"/>
+          </a:xfrm>
+          <a:prstGeom prst="rect">
+            <a:avLst/>
+          </a:prstGeom>
+        </p:spPr>
+      </p:pic>
     </p:spTree>
     <p:extLst>
       <p:ext uri="{BB962C8B-B14F-4D97-AF65-F5344CB8AC3E}">
-        <p14:creationId xmlns:p14="http://schemas.microsoft.com/office/powerpoint/2010/main" val="1463815278"/>
+        <p14:creationId xmlns:p14="http://schemas.microsoft.com/office/powerpoint/2010/main" val="2534539031"/>
       </p:ext>
     </p:extLst>
   </p:cSld>
@@ -6248,7 +6848,7 @@
           <p:cNvPr id="2" name="Title 1">
             <a:extLst>
               <a:ext uri="{FF2B5EF4-FFF2-40B4-BE49-F238E27FC236}">
-                <a16:creationId xmlns:a16="http://schemas.microsoft.com/office/drawing/2014/main" id="{A9F28CAC-4072-3078-91BE-AA151AF3DE25}"/>
+                <a16:creationId xmlns:a16="http://schemas.microsoft.com/office/drawing/2014/main" id="{81D04C3B-7250-0F16-9611-68C47733174D}"/>
               </a:ext>
             </a:extLst>
           </p:cNvPr>
@@ -6266,8 +6866,12 @@
           <a:p>
             <a:r>
               <a:rPr lang="en-US" dirty="0"/>
-              <a:t>Thank you/Questions?</a:t>
-            </a:r>
+              <a:t>Recommendations</a:t>
+            </a:r>
+            <a:br>
+              <a:rPr lang="en-US" dirty="0"/>
+            </a:br>
+            <a:endParaRPr lang="en-US" dirty="0"/>
           </a:p>
         </p:txBody>
       </p:sp>
@@ -6276,7 +6880,7 @@
           <p:cNvPr id="3" name="Content Placeholder 2">
             <a:extLst>
               <a:ext uri="{FF2B5EF4-FFF2-40B4-BE49-F238E27FC236}">
-                <a16:creationId xmlns:a16="http://schemas.microsoft.com/office/drawing/2014/main" id="{AB42E343-1351-D256-E2C3-D9DB6AA6E176}"/>
+                <a16:creationId xmlns:a16="http://schemas.microsoft.com/office/drawing/2014/main" id="{F78F10E8-E2D7-2C15-73FC-9D01235AE293}"/>
               </a:ext>
             </a:extLst>
           </p:cNvPr>
@@ -6287,10 +6891,50 @@
             <p:ph idx="1"/>
           </p:nvPr>
         </p:nvSpPr>
-        <p:spPr/>
+        <p:spPr>
+          <a:xfrm>
+            <a:off x="838200" y="1815793"/>
+            <a:ext cx="10515600" cy="4351338"/>
+          </a:xfrm>
+        </p:spPr>
         <p:txBody>
           <a:bodyPr/>
           <a:lstStyle/>
+          <a:p>
+            <a:r>
+              <a:rPr lang="en-US" dirty="0"/>
+              <a:t>To determine a price of a house, take a similar house with about 10% less </a:t>
+            </a:r>
+            <a:r>
+              <a:rPr lang="en-US" dirty="0" err="1"/>
+              <a:t>sqft</a:t>
+            </a:r>
+            <a:r>
+              <a:rPr lang="en-US" dirty="0"/>
+              <a:t> of living area and add 4.85% to that price.</a:t>
+            </a:r>
+          </a:p>
+          <a:p>
+            <a:endParaRPr lang="en-US" dirty="0"/>
+          </a:p>
+          <a:p>
+            <a:r>
+              <a:rPr lang="en-US" dirty="0"/>
+              <a:t>To determine a price of a house with a waterfront, take a similar house without a waterfront and add 39.68% to the non-waterfront price.</a:t>
+            </a:r>
+          </a:p>
+          <a:p>
+            <a:endParaRPr lang="en-US" dirty="0"/>
+          </a:p>
+          <a:p>
+            <a:r>
+              <a:rPr lang="en-US" dirty="0"/>
+              <a:t>To determine a price of a house in the Jumbo area, take a similar house not in the Jumbo area and add 76.84% to the non-Jumbo price.</a:t>
+            </a:r>
+          </a:p>
+          <a:p>
+            <a:endParaRPr lang="en-US" dirty="0"/>
+          </a:p>
           <a:p>
             <a:endParaRPr lang="en-US" dirty="0"/>
           </a:p>
@@ -6299,7 +6943,7 @@
     </p:spTree>
     <p:extLst>
       <p:ext uri="{BB962C8B-B14F-4D97-AF65-F5344CB8AC3E}">
-        <p14:creationId xmlns:p14="http://schemas.microsoft.com/office/powerpoint/2010/main" val="1924136096"/>
+        <p14:creationId xmlns:p14="http://schemas.microsoft.com/office/powerpoint/2010/main" val="3432821556"/>
       </p:ext>
     </p:extLst>
   </p:cSld>
@@ -6602,4 +7246,299 @@
     </a:ext>
   </a:extLst>
 </a:theme>
+</file>
+
+<file path=ppt/theme/theme2.xml><?xml version="1.0" encoding="utf-8"?>
+<a:theme xmlns:a="http://schemas.openxmlformats.org/drawingml/2006/main" name="Office Theme">
+  <a:themeElements>
+    <a:clrScheme name="Office">
+      <a:dk1>
+        <a:sysClr val="windowText" lastClr="000000"/>
+      </a:dk1>
+      <a:lt1>
+        <a:sysClr val="window" lastClr="FFFFFF"/>
+      </a:lt1>
+      <a:dk2>
+        <a:srgbClr val="44546A"/>
+      </a:dk2>
+      <a:lt2>
+        <a:srgbClr val="E7E6E6"/>
+      </a:lt2>
+      <a:accent1>
+        <a:srgbClr val="4472C4"/>
+      </a:accent1>
+      <a:accent2>
+        <a:srgbClr val="ED7D31"/>
+      </a:accent2>
+      <a:accent3>
+        <a:srgbClr val="A5A5A5"/>
+      </a:accent3>
+      <a:accent4>
+        <a:srgbClr val="FFC000"/>
+      </a:accent4>
+      <a:accent5>
+        <a:srgbClr val="5B9BD5"/>
+      </a:accent5>
+      <a:accent6>
+        <a:srgbClr val="70AD47"/>
+      </a:accent6>
+      <a:hlink>
+        <a:srgbClr val="0563C1"/>
+      </a:hlink>
+      <a:folHlink>
+        <a:srgbClr val="954F72"/>
+      </a:folHlink>
+    </a:clrScheme>
+    <a:fontScheme name="Office">
+      <a:majorFont>
+        <a:latin typeface="Calibri Light" panose="020F0302020204030204"/>
+        <a:ea typeface=""/>
+        <a:cs typeface=""/>
+        <a:font script="Jpan" typeface="游ゴシック Light"/>
+        <a:font script="Hang" typeface="맑은 고딕"/>
+        <a:font script="Hans" typeface="等线 Light"/>
+        <a:font script="Hant" typeface="新細明體"/>
+        <a:font script="Arab" typeface="Times New Roman"/>
+        <a:font script="Hebr" typeface="Times New Roman"/>
+        <a:font script="Thai" typeface="Angsana New"/>
+        <a:font script="Ethi" typeface="Nyala"/>
+        <a:font script="Beng" typeface="Vrinda"/>
+        <a:font script="Gujr" typeface="Shruti"/>
+        <a:font script="Khmr" typeface="MoolBoran"/>
+        <a:font script="Knda" typeface="Tunga"/>
+        <a:font script="Guru" typeface="Raavi"/>
+        <a:font script="Cans" typeface="Euphemia"/>
+        <a:font script="Cher" typeface="Plantagenet Cherokee"/>
+        <a:font script="Yiii" typeface="Microsoft Yi Baiti"/>
+        <a:font script="Tibt" typeface="Microsoft Himalaya"/>
+        <a:font script="Thaa" typeface="MV Boli"/>
+        <a:font script="Deva" typeface="Mangal"/>
+        <a:font script="Telu" typeface="Gautami"/>
+        <a:font script="Taml" typeface="Latha"/>
+        <a:font script="Syrc" typeface="Estrangelo Edessa"/>
+        <a:font script="Orya" typeface="Kalinga"/>
+        <a:font script="Mlym" typeface="Kartika"/>
+        <a:font script="Laoo" typeface="DokChampa"/>
+        <a:font script="Sinh" typeface="Iskoola Pota"/>
+        <a:font script="Mong" typeface="Mongolian Baiti"/>
+        <a:font script="Viet" typeface="Times New Roman"/>
+        <a:font script="Uigh" typeface="Microsoft Uighur"/>
+        <a:font script="Geor" typeface="Sylfaen"/>
+        <a:font script="Armn" typeface="Arial"/>
+        <a:font script="Bugi" typeface="Leelawadee UI"/>
+        <a:font script="Bopo" typeface="Microsoft JhengHei"/>
+        <a:font script="Java" typeface="Javanese Text"/>
+        <a:font script="Lisu" typeface="Segoe UI"/>
+        <a:font script="Mymr" typeface="Myanmar Text"/>
+        <a:font script="Nkoo" typeface="Ebrima"/>
+        <a:font script="Olck" typeface="Nirmala UI"/>
+        <a:font script="Osma" typeface="Ebrima"/>
+        <a:font script="Phag" typeface="Phagspa"/>
+        <a:font script="Syrn" typeface="Estrangelo Edessa"/>
+        <a:font script="Syrj" typeface="Estrangelo Edessa"/>
+        <a:font script="Syre" typeface="Estrangelo Edessa"/>
+        <a:font script="Sora" typeface="Nirmala UI"/>
+        <a:font script="Tale" typeface="Microsoft Tai Le"/>
+        <a:font script="Talu" typeface="Microsoft New Tai Lue"/>
+        <a:font script="Tfng" typeface="Ebrima"/>
+      </a:majorFont>
+      <a:minorFont>
+        <a:latin typeface="Calibri" panose="020F0502020204030204"/>
+        <a:ea typeface=""/>
+        <a:cs typeface=""/>
+        <a:font script="Jpan" typeface="游ゴシック"/>
+        <a:font script="Hang" typeface="맑은 고딕"/>
+        <a:font script="Hans" typeface="等线"/>
+        <a:font script="Hant" typeface="新細明體"/>
+        <a:font script="Arab" typeface="Arial"/>
+        <a:font script="Hebr" typeface="Arial"/>
+        <a:font script="Thai" typeface="Cordia New"/>
+        <a:font script="Ethi" typeface="Nyala"/>
+        <a:font script="Beng" typeface="Vrinda"/>
+        <a:font script="Gujr" typeface="Shruti"/>
+        <a:font script="Khmr" typeface="DaunPenh"/>
+        <a:font script="Knda" typeface="Tunga"/>
+        <a:font script="Guru" typeface="Raavi"/>
+        <a:font script="Cans" typeface="Euphemia"/>
+        <a:font script="Cher" typeface="Plantagenet Cherokee"/>
+        <a:font script="Yiii" typeface="Microsoft Yi Baiti"/>
+        <a:font script="Tibt" typeface="Microsoft Himalaya"/>
+        <a:font script="Thaa" typeface="MV Boli"/>
+        <a:font script="Deva" typeface="Mangal"/>
+        <a:font script="Telu" typeface="Gautami"/>
+        <a:font script="Taml" typeface="Latha"/>
+        <a:font script="Syrc" typeface="Estrangelo Edessa"/>
+        <a:font script="Orya" typeface="Kalinga"/>
+        <a:font script="Mlym" typeface="Kartika"/>
+        <a:font script="Laoo" typeface="DokChampa"/>
+        <a:font script="Sinh" typeface="Iskoola Pota"/>
+        <a:font script="Mong" typeface="Mongolian Baiti"/>
+        <a:font script="Viet" typeface="Arial"/>
+        <a:font script="Uigh" typeface="Microsoft Uighur"/>
+        <a:font script="Geor" typeface="Sylfaen"/>
+        <a:font script="Armn" typeface="Arial"/>
+        <a:font script="Bugi" typeface="Leelawadee UI"/>
+        <a:font script="Bopo" typeface="Microsoft JhengHei"/>
+        <a:font script="Java" typeface="Javanese Text"/>
+        <a:font script="Lisu" typeface="Segoe UI"/>
+        <a:font script="Mymr" typeface="Myanmar Text"/>
+        <a:font script="Nkoo" typeface="Ebrima"/>
+        <a:font script="Olck" typeface="Nirmala UI"/>
+        <a:font script="Osma" typeface="Ebrima"/>
+        <a:font script="Phag" typeface="Phagspa"/>
+        <a:font script="Syrn" typeface="Estrangelo Edessa"/>
+        <a:font script="Syrj" typeface="Estrangelo Edessa"/>
+        <a:font script="Syre" typeface="Estrangelo Edessa"/>
+        <a:font script="Sora" typeface="Nirmala UI"/>
+        <a:font script="Tale" typeface="Microsoft Tai Le"/>
+        <a:font script="Talu" typeface="Microsoft New Tai Lue"/>
+        <a:font script="Tfng" typeface="Ebrima"/>
+      </a:minorFont>
+    </a:fontScheme>
+    <a:fmtScheme name="Office">
+      <a:fillStyleLst>
+        <a:solidFill>
+          <a:schemeClr val="phClr"/>
+        </a:solidFill>
+        <a:gradFill rotWithShape="1">
+          <a:gsLst>
+            <a:gs pos="0">
+              <a:schemeClr val="phClr">
+                <a:lumMod val="110000"/>
+                <a:satMod val="105000"/>
+                <a:tint val="67000"/>
+              </a:schemeClr>
+            </a:gs>
+            <a:gs pos="50000">
+              <a:schemeClr val="phClr">
+                <a:lumMod val="105000"/>
+                <a:satMod val="103000"/>
+                <a:tint val="73000"/>
+              </a:schemeClr>
+            </a:gs>
+            <a:gs pos="100000">
+              <a:schemeClr val="phClr">
+                <a:lumMod val="105000"/>
+                <a:satMod val="109000"/>
+                <a:tint val="81000"/>
+              </a:schemeClr>
+            </a:gs>
+          </a:gsLst>
+          <a:lin ang="5400000" scaled="0"/>
+        </a:gradFill>
+        <a:gradFill rotWithShape="1">
+          <a:gsLst>
+            <a:gs pos="0">
+              <a:schemeClr val="phClr">
+                <a:satMod val="103000"/>
+                <a:lumMod val="102000"/>
+                <a:tint val="94000"/>
+              </a:schemeClr>
+            </a:gs>
+            <a:gs pos="50000">
+              <a:schemeClr val="phClr">
+                <a:satMod val="110000"/>
+                <a:lumMod val="100000"/>
+                <a:shade val="100000"/>
+              </a:schemeClr>
+            </a:gs>
+            <a:gs pos="100000">
+              <a:schemeClr val="phClr">
+                <a:lumMod val="99000"/>
+                <a:satMod val="120000"/>
+                <a:shade val="78000"/>
+              </a:schemeClr>
+            </a:gs>
+          </a:gsLst>
+          <a:lin ang="5400000" scaled="0"/>
+        </a:gradFill>
+      </a:fillStyleLst>
+      <a:lnStyleLst>
+        <a:ln w="6350" cap="flat" cmpd="sng" algn="ctr">
+          <a:solidFill>
+            <a:schemeClr val="phClr"/>
+          </a:solidFill>
+          <a:prstDash val="solid"/>
+          <a:miter lim="800000"/>
+        </a:ln>
+        <a:ln w="12700" cap="flat" cmpd="sng" algn="ctr">
+          <a:solidFill>
+            <a:schemeClr val="phClr"/>
+          </a:solidFill>
+          <a:prstDash val="solid"/>
+          <a:miter lim="800000"/>
+        </a:ln>
+        <a:ln w="19050" cap="flat" cmpd="sng" algn="ctr">
+          <a:solidFill>
+            <a:schemeClr val="phClr"/>
+          </a:solidFill>
+          <a:prstDash val="solid"/>
+          <a:miter lim="800000"/>
+        </a:ln>
+      </a:lnStyleLst>
+      <a:effectStyleLst>
+        <a:effectStyle>
+          <a:effectLst/>
+        </a:effectStyle>
+        <a:effectStyle>
+          <a:effectLst/>
+        </a:effectStyle>
+        <a:effectStyle>
+          <a:effectLst>
+            <a:outerShdw blurRad="57150" dist="19050" dir="5400000" algn="ctr" rotWithShape="0">
+              <a:srgbClr val="000000">
+                <a:alpha val="63000"/>
+              </a:srgbClr>
+            </a:outerShdw>
+          </a:effectLst>
+        </a:effectStyle>
+      </a:effectStyleLst>
+      <a:bgFillStyleLst>
+        <a:solidFill>
+          <a:schemeClr val="phClr"/>
+        </a:solidFill>
+        <a:solidFill>
+          <a:schemeClr val="phClr">
+            <a:tint val="95000"/>
+            <a:satMod val="170000"/>
+          </a:schemeClr>
+        </a:solidFill>
+        <a:gradFill rotWithShape="1">
+          <a:gsLst>
+            <a:gs pos="0">
+              <a:schemeClr val="phClr">
+                <a:tint val="93000"/>
+                <a:satMod val="150000"/>
+                <a:shade val="98000"/>
+                <a:lumMod val="102000"/>
+              </a:schemeClr>
+            </a:gs>
+            <a:gs pos="50000">
+              <a:schemeClr val="phClr">
+                <a:tint val="98000"/>
+                <a:satMod val="130000"/>
+                <a:shade val="90000"/>
+                <a:lumMod val="103000"/>
+              </a:schemeClr>
+            </a:gs>
+            <a:gs pos="100000">
+              <a:schemeClr val="phClr">
+                <a:shade val="63000"/>
+                <a:satMod val="120000"/>
+              </a:schemeClr>
+            </a:gs>
+          </a:gsLst>
+          <a:lin ang="5400000" scaled="0"/>
+        </a:gradFill>
+      </a:bgFillStyleLst>
+    </a:fmtScheme>
+  </a:themeElements>
+  <a:objectDefaults/>
+  <a:extraClrSchemeLst/>
+  <a:extLst>
+    <a:ext uri="{05A4C25C-085E-4340-85A3-A5531E510DB2}">
+      <thm15:themeFamily xmlns:thm15="http://schemas.microsoft.com/office/thememl/2012/main" name="Office Theme" id="{62F939B6-93AF-4DB8-9C6B-D6C7DFDC589F}" vid="{4A3C46E8-61CC-4603-A589-7422A47A8E4A}"/>
+    </a:ext>
+  </a:extLst>
+</a:theme>
 </file>
</xml_diff>